<commit_message>
Got basic functionality working
</commit_message>
<xml_diff>
--- a/Project_KALM/MSP_Template.pptx
+++ b/Project_KALM/MSP_Template.pptx
@@ -343,7 +343,7 @@
           <a:p>
             <a:fld id="{EEC665CA-D682-48EC-95D2-126FD6449D65}" type="datetime1">
               <a:rPr lang="de-CH" sz="900" smtClean="0"/>
-              <a:t>26.05.2025</a:t>
+              <a:t>01.07.2025</a:t>
             </a:fld>
             <a:endParaRPr lang="de-CH" sz="900"/>
           </a:p>
@@ -661,7 +661,7 @@
           <a:p>
             <a:fld id="{A17AAF7D-4283-4014-80F4-26E915FEACF8}" type="datetime1">
               <a:rPr lang="de-CH" smtClean="0"/>
-              <a:t>26.05.2025</a:t>
+              <a:t>30.06.2025</a:t>
             </a:fld>
             <a:endParaRPr lang="de-CH" dirty="0"/>
           </a:p>
@@ -1036,7 +1036,7 @@
           <a:p>
             <a:fld id="{E471F87F-7CC2-488B-AD55-33485FC98B76}" type="datetime1">
               <a:rPr lang="de-DE" smtClean="0"/>
-              <a:t>26.05.2025</a:t>
+              <a:t>30.06.2025</a:t>
             </a:fld>
             <a:endParaRPr lang="de-CH" dirty="0"/>
           </a:p>
@@ -1433,7 +1433,7 @@
           <a:p>
             <a:fld id="{C97BF1D7-D20B-4528-9E03-8B18AB702752}" type="datetime1">
               <a:rPr lang="de-DE" smtClean="0"/>
-              <a:t>26.05.2025</a:t>
+              <a:t>30.06.2025</a:t>
             </a:fld>
             <a:endParaRPr lang="de-CH" dirty="0"/>
           </a:p>
@@ -2116,7 +2116,7 @@
           <a:p>
             <a:fld id="{B2DD1E4E-1107-499B-BB00-8AA0260A0EFB}" type="datetime1">
               <a:rPr lang="de-DE" smtClean="0"/>
-              <a:t>26.05.2025</a:t>
+              <a:t>30.06.2025</a:t>
             </a:fld>
             <a:endParaRPr lang="de-CH" dirty="0"/>
           </a:p>
@@ -2338,7 +2338,7 @@
           <a:p>
             <a:fld id="{23907732-924E-43E9-B4C2-6CF127C307EB}" type="datetime1">
               <a:rPr lang="de-DE" smtClean="0"/>
-              <a:t>26.05.2025</a:t>
+              <a:t>30.06.2025</a:t>
             </a:fld>
             <a:endParaRPr lang="de-CH" dirty="0"/>
           </a:p>
@@ -2589,7 +2589,7 @@
           <a:p>
             <a:fld id="{A6195A94-05D5-4DEC-81F7-6AB426E292F4}" type="datetime1">
               <a:rPr lang="de-DE" smtClean="0"/>
-              <a:t>26.05.2025</a:t>
+              <a:t>30.06.2025</a:t>
             </a:fld>
             <a:endParaRPr lang="de-CH" dirty="0"/>
           </a:p>
@@ -2806,7 +2806,7 @@
           <a:p>
             <a:fld id="{052279FA-DBB5-4713-9CD9-90401A466906}" type="datetime1">
               <a:rPr lang="de-DE" smtClean="0"/>
-              <a:t>26.05.2025</a:t>
+              <a:t>30.06.2025</a:t>
             </a:fld>
             <a:endParaRPr lang="de-CH" dirty="0"/>
           </a:p>
@@ -2991,7 +2991,7 @@
           <a:p>
             <a:fld id="{1A622A08-A377-47C6-B39F-B1E1F769F25A}" type="datetime1">
               <a:rPr lang="de-DE" smtClean="0"/>
-              <a:t>26.05.2025</a:t>
+              <a:t>30.06.2025</a:t>
             </a:fld>
             <a:endParaRPr lang="de-CH" dirty="0"/>
           </a:p>
@@ -3269,7 +3269,7 @@
           <a:p>
             <a:fld id="{7A628CE2-D1EA-49D7-88A5-9921AB788BF8}" type="datetime1">
               <a:rPr lang="de-DE" smtClean="0"/>
-              <a:t>26.05.2025</a:t>
+              <a:t>30.06.2025</a:t>
             </a:fld>
             <a:endParaRPr lang="de-CH" dirty="0"/>
           </a:p>
@@ -3488,7 +3488,7 @@
           <a:p>
             <a:fld id="{5B884AD1-A783-44E4-89C8-03B3CA1C81C1}" type="datetime1">
               <a:rPr lang="de-DE" smtClean="0"/>
-              <a:t>26.05.2025</a:t>
+              <a:t>30.06.2025</a:t>
             </a:fld>
             <a:endParaRPr lang="de-CH" dirty="0"/>
           </a:p>
@@ -3727,7 +3727,7 @@
           <a:p>
             <a:fld id="{2E8A167D-93E7-43CF-ADB7-181D413D4773}" type="datetime1">
               <a:rPr lang="de-DE" smtClean="0"/>
-              <a:t>26.05.2025</a:t>
+              <a:t>30.06.2025</a:t>
             </a:fld>
             <a:endParaRPr lang="de-CH" dirty="0"/>
           </a:p>
@@ -4006,7 +4006,7 @@
           <a:p>
             <a:fld id="{698FC4C5-3ADA-44FA-AF24-1DAFEB8AF652}" type="datetime1">
               <a:rPr lang="de-DE" smtClean="0"/>
-              <a:t>26.05.2025</a:t>
+              <a:t>30.06.2025</a:t>
             </a:fld>
             <a:endParaRPr lang="de-CH" dirty="0"/>
           </a:p>
@@ -4577,7 +4577,7 @@
           <a:p>
             <a:fld id="{DE4FA439-CAC9-4573-B1B3-2D68157B76DD}" type="datetime3">
               <a:rPr lang="en-US" smtClean="0"/>
-              <a:t>26 May 2025</a:t>
+              <a:t>30 June 2025</a:t>
             </a:fld>
             <a:endParaRPr lang="de-CH"/>
           </a:p>
@@ -4844,11 +4844,11 @@
   <p:clrMapOvr>
     <a:masterClrMapping/>
   </p:clrMapOvr>
-  <mc:AlternateContent xmlns:mc="http://schemas.openxmlformats.org/markup-compatibility/2006">
-    <mc:Choice xmlns:p14="http://schemas.microsoft.com/office/powerpoint/2010/main" Requires="p14">
+  <mc:AlternateContent xmlns:mc="http://schemas.openxmlformats.org/markup-compatibility/2006" xmlns:p14="http://schemas.microsoft.com/office/powerpoint/2010/main">
+    <mc:Choice Requires="p14">
       <p:transition spd="slow" p14:dur="2000" advClick="0" advTm="10000"/>
     </mc:Choice>
-    <mc:Fallback>
+    <mc:Fallback xmlns="">
       <p:transition spd="slow" advClick="0" advTm="10000"/>
     </mc:Fallback>
   </mc:AlternateContent>
@@ -5692,7 +5692,11 @@
           <a:bodyPr/>
           <a:lstStyle/>
           <a:p>
-            <a:endParaRPr lang="de-CH"/>
+            <a:r>
+              <a:rPr lang="en-CH" dirty="0"/>
+              <a:t>Challenges</a:t>
+            </a:r>
+            <a:endParaRPr lang="de-CH" dirty="0"/>
           </a:p>
         </p:txBody>
       </p:sp>
@@ -5719,7 +5723,7 @@
           <a:p>
             <a:fld id="{3CAC52EE-1A92-4CB4-BCAA-EDE3CF50CF3F}" type="datetime1">
               <a:rPr lang="de-DE" smtClean="0"/>
-              <a:t>26.05.2025</a:t>
+              <a:t>30.06.2025</a:t>
             </a:fld>
             <a:endParaRPr lang="de-CH" dirty="0"/>
           </a:p>
@@ -5781,6 +5785,136 @@
               <a:t>4</a:t>
             </a:fld>
             <a:endParaRPr lang="de-CH" dirty="0"/>
+          </a:p>
+        </p:txBody>
+      </p:sp>
+      <p:sp>
+        <p:nvSpPr>
+          <p:cNvPr id="2" name="TextBox 1">
+            <a:extLst>
+              <a:ext uri="{FF2B5EF4-FFF2-40B4-BE49-F238E27FC236}">
+                <a16:creationId xmlns:a16="http://schemas.microsoft.com/office/drawing/2014/main" id="{9CD249CE-38D0-77F9-332A-872F7BC551C3}"/>
+              </a:ext>
+            </a:extLst>
+          </p:cNvPr>
+          <p:cNvSpPr txBox="1"/>
+          <p:nvPr/>
+        </p:nvSpPr>
+        <p:spPr>
+          <a:xfrm>
+            <a:off x="695400" y="2348880"/>
+            <a:ext cx="10299714" cy="2492990"/>
+          </a:xfrm>
+          <a:prstGeom prst="rect">
+            <a:avLst/>
+          </a:prstGeom>
+          <a:noFill/>
+        </p:spPr>
+        <p:txBody>
+          <a:bodyPr wrap="square" lIns="0" tIns="0" rIns="0" bIns="0" rtlCol="0">
+            <a:spAutoFit/>
+          </a:bodyPr>
+          <a:lstStyle/>
+          <a:p>
+            <a:r>
+              <a:rPr lang="en-CH" dirty="0"/>
+              <a:t>Forcing </a:t>
+            </a:r>
+            <a:r>
+              <a:rPr lang="en-CH" dirty="0" err="1"/>
+              <a:t>numpy</a:t>
+            </a:r>
+            <a:r>
+              <a:rPr lang="en-CH" dirty="0"/>
+              <a:t> to use matrix multiplication (for instance in the outer product)</a:t>
+            </a:r>
+          </a:p>
+          <a:p>
+            <a:endParaRPr lang="en-CH" dirty="0"/>
+          </a:p>
+          <a:p>
+            <a:r>
+              <a:rPr lang="en-CH" dirty="0"/>
+              <a:t>Bad initial guesses for error:</a:t>
+            </a:r>
+          </a:p>
+          <a:p>
+            <a:r>
+              <a:rPr lang="de-CH" dirty="0"/>
+              <a:t>P[0] = </a:t>
+            </a:r>
+            <a:r>
+              <a:rPr lang="de-CH" dirty="0" err="1"/>
+              <a:t>np.array</a:t>
+            </a:r>
+            <a:r>
+              <a:rPr lang="de-CH" dirty="0"/>
+              <a:t>([</a:t>
+            </a:r>
+            <a:r>
+              <a:rPr lang="de-CH" dirty="0" err="1"/>
+              <a:t>initial_pos_std</a:t>
+            </a:r>
+            <a:r>
+              <a:rPr lang="de-CH" dirty="0"/>
+              <a:t>**2, </a:t>
+            </a:r>
+            <a:r>
+              <a:rPr lang="de-CH" dirty="0" err="1"/>
+              <a:t>initial_vel_std</a:t>
+            </a:r>
+            <a:r>
+              <a:rPr lang="de-CH" dirty="0"/>
+              <a:t>**2])</a:t>
+            </a:r>
+          </a:p>
+          <a:p>
+            <a:r>
+              <a:rPr lang="en-CH">
+                <a:sym typeface="Wingdings" panose="05000000000000000000" pitchFamily="2" charset="2"/>
+              </a:rPr>
+              <a:t></a:t>
+            </a:r>
+            <a:endParaRPr lang="en-CH" dirty="0"/>
+          </a:p>
+          <a:p>
+            <a:r>
+              <a:rPr lang="de-CH" dirty="0"/>
+              <a:t>P[0] = </a:t>
+            </a:r>
+            <a:r>
+              <a:rPr lang="de-CH" dirty="0" err="1"/>
+              <a:t>np.diag</a:t>
+            </a:r>
+            <a:r>
+              <a:rPr lang="de-CH" dirty="0"/>
+              <a:t>([</a:t>
+            </a:r>
+            <a:r>
+              <a:rPr lang="de-CH" dirty="0" err="1"/>
+              <a:t>initial_pos_std</a:t>
+            </a:r>
+            <a:r>
+              <a:rPr lang="de-CH" dirty="0"/>
+              <a:t>**2, </a:t>
+            </a:r>
+            <a:r>
+              <a:rPr lang="de-CH" dirty="0" err="1"/>
+              <a:t>initial_vel_std</a:t>
+            </a:r>
+            <a:r>
+              <a:rPr lang="de-CH" dirty="0"/>
+              <a:t>**2])</a:t>
+            </a:r>
+          </a:p>
+          <a:p>
+            <a:br>
+              <a:rPr lang="de-CH" dirty="0"/>
+            </a:br>
+            <a:endParaRPr lang="de-CH" dirty="0"/>
+          </a:p>
+          <a:p>
+            <a:endParaRPr lang="en-CH" dirty="0"/>
           </a:p>
         </p:txBody>
       </p:sp>
@@ -5887,7 +6021,7 @@
           <a:p>
             <a:fld id="{E5DBBF47-BFE4-482E-ACDC-02638A5F301F}" type="datetime1">
               <a:rPr lang="de-DE" smtClean="0"/>
-              <a:t>26.05.2025</a:t>
+              <a:t>30.06.2025</a:t>
             </a:fld>
             <a:endParaRPr lang="de-CH" dirty="0"/>
           </a:p>
@@ -6814,7 +6948,7 @@
 
 <file path=ppt/webextensions/taskpanes.xml><?xml version="1.0" encoding="utf-8"?>
 <wetp:taskpanes xmlns:wetp="http://schemas.microsoft.com/office/webextensions/taskpanes/2010/11">
-  <wetp:taskpane dockstate="right" visibility="0" width="525" row="0">
+  <wetp:taskpane dockstate="right" visibility="0" width="350" row="0">
     <wetp:webextensionref xmlns:r="http://schemas.openxmlformats.org/officeDocument/2006/relationships" r:id="rId1"/>
   </wetp:taskpane>
 </wetp:taskpanes>
@@ -6835,21 +6969,6 @@
 </file>
 
 <file path=customXml/item1.xml><?xml version="1.0" encoding="utf-8"?>
-<?mso-contentType ?>
-<FormTemplates xmlns="http://schemas.microsoft.com/sharepoint/v3/contenttype/forms">
-  <Display>DocumentLibraryForm</Display>
-  <Edit>DocumentLibraryForm</Edit>
-  <New>DocumentLibraryForm</New>
-</FormTemplates>
-</file>
-
-<file path=customXml/item2.xml><?xml version="1.0" encoding="utf-8"?>
-<p:properties xmlns:p="http://schemas.microsoft.com/office/2006/metadata/properties" xmlns:xsi="http://www.w3.org/2001/XMLSchema-instance" xmlns:pc="http://schemas.microsoft.com/office/infopath/2007/PartnerControls">
-  <documentManagement/>
-</p:properties>
-</file>
-
-<file path=customXml/item3.xml><?xml version="1.0" encoding="utf-8"?>
 <ct:contentTypeSchema xmlns:ct="http://schemas.microsoft.com/office/2006/metadata/contentType" xmlns:ma="http://schemas.microsoft.com/office/2006/metadata/properties/metaAttributes" ct:_="" ma:_="" ma:contentTypeName="Dokument" ma:contentTypeID="0x010100F336E6A137EBA04CAA14C83E6B567E6E" ma:contentTypeVersion="4" ma:contentTypeDescription="Ein neues Dokument erstellen." ma:contentTypeScope="" ma:versionID="506964d69c7fa676f2673ca1c565f571">
   <xsd:schema xmlns:xsd="http://www.w3.org/2001/XMLSchema" xmlns:xs="http://www.w3.org/2001/XMLSchema" xmlns:p="http://schemas.microsoft.com/office/2006/metadata/properties" xmlns:ns2="5019f46e-7630-4c10-8bcc-ae747be1e2f1" targetNamespace="http://schemas.microsoft.com/office/2006/metadata/properties" ma:root="true" ma:fieldsID="6f33e12c5860b9710acc1ab8237e07cc" ns2:_="">
     <xsd:import namespace="5019f46e-7630-4c10-8bcc-ae747be1e2f1"/>
@@ -6993,10 +7112,35 @@
 </ct:contentTypeSchema>
 </file>
 
+<file path=customXml/item2.xml><?xml version="1.0" encoding="utf-8"?>
+<p:properties xmlns:p="http://schemas.microsoft.com/office/2006/metadata/properties" xmlns:xsi="http://www.w3.org/2001/XMLSchema-instance" xmlns:pc="http://schemas.microsoft.com/office/infopath/2007/PartnerControls">
+  <documentManagement/>
+</p:properties>
+</file>
+
+<file path=customXml/item3.xml><?xml version="1.0" encoding="utf-8"?>
+<?mso-contentType ?>
+<FormTemplates xmlns="http://schemas.microsoft.com/sharepoint/v3/contenttype/forms">
+  <Display>DocumentLibraryForm</Display>
+  <Edit>DocumentLibraryForm</Edit>
+  <New>DocumentLibraryForm</New>
+</FormTemplates>
+</file>
+
 <file path=customXml/itemProps1.xml><?xml version="1.0" encoding="utf-8"?>
-<ds:datastoreItem xmlns:ds="http://schemas.openxmlformats.org/officeDocument/2006/customXml" ds:itemID="{4B6B7BE2-63AD-4C37-AC44-F0E4FC348E24}">
+<ds:datastoreItem xmlns:ds="http://schemas.openxmlformats.org/officeDocument/2006/customXml" ds:itemID="{E53FC72E-3252-48C8-88DD-D79C2930A3EF}">
   <ds:schemaRefs>
-    <ds:schemaRef ds:uri="http://schemas.microsoft.com/sharepoint/v3/contenttype/forms"/>
+    <ds:schemaRef ds:uri="http://schemas.microsoft.com/office/2006/metadata/contentType"/>
+    <ds:schemaRef ds:uri="http://schemas.microsoft.com/office/2006/metadata/properties/metaAttributes"/>
+    <ds:schemaRef ds:uri="http://www.w3.org/2001/XMLSchema"/>
+    <ds:schemaRef ds:uri="http://schemas.microsoft.com/office/2006/metadata/properties"/>
+    <ds:schemaRef ds:uri="5019f46e-7630-4c10-8bcc-ae747be1e2f1"/>
+    <ds:schemaRef ds:uri="http://schemas.microsoft.com/office/2006/documentManagement/types"/>
+    <ds:schemaRef ds:uri="http://schemas.microsoft.com/office/infopath/2007/PartnerControls"/>
+    <ds:schemaRef ds:uri="http://schemas.openxmlformats.org/package/2006/metadata/core-properties"/>
+    <ds:schemaRef ds:uri="http://purl.org/dc/elements/1.1/"/>
+    <ds:schemaRef ds:uri="http://purl.org/dc/terms/"/>
+    <ds:schemaRef ds:uri="http://schemas.microsoft.com/internal/obd"/>
   </ds:schemaRefs>
 </ds:datastoreItem>
 </file>
@@ -7019,19 +7163,9 @@
 </file>
 
 <file path=customXml/itemProps3.xml><?xml version="1.0" encoding="utf-8"?>
-<ds:datastoreItem xmlns:ds="http://schemas.openxmlformats.org/officeDocument/2006/customXml" ds:itemID="{E53FC72E-3252-48C8-88DD-D79C2930A3EF}">
+<ds:datastoreItem xmlns:ds="http://schemas.openxmlformats.org/officeDocument/2006/customXml" ds:itemID="{4B6B7BE2-63AD-4C37-AC44-F0E4FC348E24}">
   <ds:schemaRefs>
-    <ds:schemaRef ds:uri="http://schemas.microsoft.com/office/2006/metadata/contentType"/>
-    <ds:schemaRef ds:uri="http://schemas.microsoft.com/office/2006/metadata/properties/metaAttributes"/>
-    <ds:schemaRef ds:uri="http://www.w3.org/2001/XMLSchema"/>
-    <ds:schemaRef ds:uri="http://schemas.microsoft.com/office/2006/metadata/properties"/>
-    <ds:schemaRef ds:uri="5019f46e-7630-4c10-8bcc-ae747be1e2f1"/>
-    <ds:schemaRef ds:uri="http://schemas.microsoft.com/office/2006/documentManagement/types"/>
-    <ds:schemaRef ds:uri="http://schemas.microsoft.com/office/infopath/2007/PartnerControls"/>
-    <ds:schemaRef ds:uri="http://schemas.openxmlformats.org/package/2006/metadata/core-properties"/>
-    <ds:schemaRef ds:uri="http://purl.org/dc/elements/1.1/"/>
-    <ds:schemaRef ds:uri="http://purl.org/dc/terms/"/>
-    <ds:schemaRef ds:uri="http://schemas.microsoft.com/internal/obd"/>
+    <ds:schemaRef ds:uri="http://schemas.microsoft.com/sharepoint/v3/contenttype/forms"/>
   </ds:schemaRefs>
 </ds:datastoreItem>
 </file>
</xml_diff>